<commit_message>
KPK Team Project + Development tools HW
</commit_message>
<xml_diff>
--- a/KPK/Lectures/14. Development Tools.pptx
+++ b/KPK/Lectures/14. Development Tools.pptx
@@ -232,7 +232,7 @@
   </p:defaultTextStyle>
   <p:extLst>
     <p:ext uri="{EFAFB233-063F-42B5-8137-9DF3F51BA10A}">
-      <p15:sldGuideLst xmlns:p15="http://schemas.microsoft.com/office/powerpoint/2012/main">
+      <p15:sldGuideLst xmlns:p15="http://schemas.microsoft.com/office/powerpoint/2012/main" xmlns="">
         <p15:guide id="1" orient="horz" pos="2160">
           <p15:clr>
             <a:srgbClr val="A4A3A4"/>
@@ -246,7 +246,7 @@
       </p15:sldGuideLst>
     </p:ext>
     <p:ext uri="{2D200454-40CA-4A62-9FC3-DE9A4176ACB9}">
-      <p15:notesGuideLst xmlns:p15="http://schemas.microsoft.com/office/powerpoint/2012/main">
+      <p15:notesGuideLst xmlns:p15="http://schemas.microsoft.com/office/powerpoint/2012/main" xmlns="">
         <p15:guide id="1" orient="horz" pos="2928">
           <p15:clr>
             <a:srgbClr val="A4A3A4"/>
@@ -378,7 +378,7 @@
             <a:fld id="{3BF7C7B5-275F-4D1F-9AB4-9255447DBC73}" type="datetimeFigureOut">
               <a:rPr lang="en-US"/>
               <a:pPr/>
-              <a:t>1/29/2013</a:t>
+              <a:t>4/30/2013</a:t>
             </a:fld>
             <a:endParaRPr lang="en-US" dirty="0"/>
           </a:p>
@@ -609,7 +609,7 @@
             <a:fld id="{9B46F231-FB2B-4655-A644-E2477325E686}" type="datetimeFigureOut">
               <a:rPr lang="en-US"/>
               <a:pPr/>
-              <a:t>1/29/2013</a:t>
+              <a:t>4/30/2013</a:t>
             </a:fld>
             <a:endParaRPr lang="en-US" dirty="0"/>
           </a:p>
@@ -7533,7 +7533,11 @@
             </a:pPr>
             <a:r>
               <a:rPr lang="en-US" dirty="0" smtClean="0"/>
-              <a:t>The most popular and well established system</a:t>
+              <a:t>Popular </a:t>
+            </a:r>
+            <a:r>
+              <a:rPr lang="en-US" dirty="0" smtClean="0"/>
+              <a:t>and well established system</a:t>
             </a:r>
           </a:p>
           <a:p>
@@ -13247,24 +13251,7 @@
                 <a:latin typeface="Consolas" pitchFamily="49" charset="0"/>
                 <a:cs typeface="Consolas" pitchFamily="49" charset="0"/>
               </a:rPr>
-              <a:t>  </a:t>
-            </a:r>
-            <a:r>
-              <a:rPr lang="en-US" sz="2000" b="1" noProof="1" smtClean="0">
-                <a:solidFill>
-                  <a:srgbClr val="8CF4F2"/>
-                </a:solidFill>
-                <a:effectLst>
-                  <a:outerShdw blurRad="38100" dist="38100" dir="2700000" algn="tl">
-                    <a:srgbClr val="000000">
-                      <a:alpha val="43137"/>
-                    </a:srgbClr>
-                  </a:outerShdw>
-                </a:effectLst>
-                <a:latin typeface="Consolas" pitchFamily="49" charset="0"/>
-                <a:cs typeface="Consolas" pitchFamily="49" charset="0"/>
-              </a:rPr>
-              <a:t>{</a:t>
+              <a:t>  {</a:t>
             </a:r>
           </a:p>
           <a:p>
@@ -13298,39 +13285,8 @@
                 <a:latin typeface="Consolas" pitchFamily="49" charset="0"/>
                 <a:cs typeface="Consolas" pitchFamily="49" charset="0"/>
               </a:rPr>
-              <a:t> </a:t>
-            </a:r>
-            <a:r>
-              <a:rPr lang="en-US" sz="2000" b="1" noProof="1">
-                <a:solidFill>
-                  <a:srgbClr val="8CF4F2"/>
-                </a:solidFill>
-                <a:effectLst>
-                  <a:outerShdw blurRad="38100" dist="38100" dir="2700000" algn="tl">
-                    <a:srgbClr val="000000">
-                      <a:alpha val="43137"/>
-                    </a:srgbClr>
-                  </a:outerShdw>
-                </a:effectLst>
-                <a:latin typeface="Consolas" pitchFamily="49" charset="0"/>
-                <a:cs typeface="Consolas" pitchFamily="49" charset="0"/>
-              </a:rPr>
-              <a:t>   BasicConfigurator.Configure();</a:t>
-            </a:r>
-            <a:endParaRPr lang="en-US" sz="2000" b="1" noProof="1">
-              <a:solidFill>
-                <a:srgbClr val="8CF4F2"/>
-              </a:solidFill>
-              <a:effectLst>
-                <a:outerShdw blurRad="38100" dist="38100" dir="2700000" algn="tl">
-                  <a:srgbClr val="000000">
-                    <a:alpha val="43137"/>
-                  </a:srgbClr>
-                </a:outerShdw>
-              </a:effectLst>
-              <a:latin typeface="Consolas" pitchFamily="49" charset="0"/>
-              <a:cs typeface="Consolas" pitchFamily="49" charset="0"/>
-            </a:endParaRPr>
+              <a:t>    BasicConfigurator.Configure();</a:t>
+            </a:r>
           </a:p>
           <a:p>
             <a:pPr eaLnBrk="0" hangingPunct="0">
@@ -18031,7 +17987,19 @@
           <a:p>
             <a:r>
               <a:rPr lang="en-US" dirty="0" smtClean="0"/>
-              <a:t>Code decomplator / code disassembler</a:t>
+              <a:t>Code </a:t>
+            </a:r>
+            <a:r>
+              <a:rPr lang="en-US" dirty="0" err="1" smtClean="0"/>
+              <a:t>decompilator</a:t>
+            </a:r>
+            <a:r>
+              <a:rPr lang="en-US" dirty="0" smtClean="0"/>
+              <a:t> </a:t>
+            </a:r>
+            <a:r>
+              <a:rPr lang="en-US" dirty="0" smtClean="0"/>
+              <a:t>/ code disassembler</a:t>
             </a:r>
           </a:p>
           <a:p>

</xml_diff>